<commit_message>
[Academy]Update for some IO and JDBC files
</commit_message>
<xml_diff>
--- a/AdvancedJava-master/io/doc/JavaAcademy-IO.pptx
+++ b/AdvancedJava-master/io/doc/JavaAcademy-IO.pptx
@@ -6,10 +6,10 @@
     <p:sldMasterId id="2147483798" r:id="rId2"/>
   </p:sldMasterIdLst>
   <p:notesMasterIdLst>
-    <p:notesMasterId r:id="rId21"/>
+    <p:notesMasterId r:id="rId20"/>
   </p:notesMasterIdLst>
   <p:handoutMasterIdLst>
-    <p:handoutMasterId r:id="rId22"/>
+    <p:handoutMasterId r:id="rId21"/>
   </p:handoutMasterIdLst>
   <p:sldIdLst>
     <p:sldId id="277" r:id="rId3"/>
@@ -29,7 +29,6 @@
     <p:sldId id="364" r:id="rId17"/>
     <p:sldId id="353" r:id="rId18"/>
     <p:sldId id="281" r:id="rId19"/>
-    <p:sldId id="282" r:id="rId20"/>
   </p:sldIdLst>
   <p:sldSz cx="9144000" cy="6858000" type="screen4x3"/>
   <p:notesSz cx="6858000" cy="9144000"/>
@@ -158,6 +157,36 @@
       </a:defRPr>
     </a:lvl9pPr>
   </p:defaultTextStyle>
+  <p:extLst>
+    <p:ext uri="{EFAFB233-063F-42B5-8137-9DF3F51BA10A}">
+      <p15:sldGuideLst xmlns:p15="http://schemas.microsoft.com/office/powerpoint/2012/main">
+        <p15:guide id="1" orient="horz" pos="2160">
+          <p15:clr>
+            <a:srgbClr val="A4A3A4"/>
+          </p15:clr>
+        </p15:guide>
+        <p15:guide id="2" pos="2880">
+          <p15:clr>
+            <a:srgbClr val="A4A3A4"/>
+          </p15:clr>
+        </p15:guide>
+      </p15:sldGuideLst>
+    </p:ext>
+    <p:ext uri="{2D200454-40CA-4A62-9FC3-DE9A4176ACB9}">
+      <p15:notesGuideLst xmlns:p15="http://schemas.microsoft.com/office/powerpoint/2012/main">
+        <p15:guide id="1" orient="horz" pos="2880">
+          <p15:clr>
+            <a:srgbClr val="A4A3A4"/>
+          </p15:clr>
+        </p15:guide>
+        <p15:guide id="2" pos="2160">
+          <p15:clr>
+            <a:srgbClr val="A4A3A4"/>
+          </p15:clr>
+        </p15:guide>
+      </p15:notesGuideLst>
+    </p:ext>
+  </p:extLst>
 </p:presentation>
 </file>
 
@@ -244,7 +273,7 @@
             <a:fld id="{E23C31A4-E588-4D7D-8556-3E7A80E3618E}" type="datetimeFigureOut">
               <a:rPr lang="es-MX" smtClean="0"/>
               <a:pPr/>
-              <a:t>05/08/2015</a:t>
+              <a:t>09/12/2016</a:t>
             </a:fld>
             <a:endParaRPr lang="es-MX"/>
           </a:p>
@@ -320,7 +349,7 @@
     </p:spTree>
     <p:extLst>
       <p:ext uri="{BB962C8B-B14F-4D97-AF65-F5344CB8AC3E}">
-        <p14:creationId xmlns:p14="http://schemas.microsoft.com/office/powerpoint/2010/main" xmlns="" val="1178701457"/>
+        <p14:creationId xmlns:p14="http://schemas.microsoft.com/office/powerpoint/2010/main" val="1178701457"/>
       </p:ext>
     </p:extLst>
   </p:cSld>
@@ -423,7 +452,7 @@
               <a:pPr>
                 <a:defRPr/>
               </a:pPr>
-              <a:t>05/08/2015</a:t>
+              <a:t>09/12/2016</a:t>
             </a:fld>
             <a:endParaRPr lang="es-MX" dirty="0"/>
           </a:p>
@@ -607,7 +636,7 @@
     </p:spTree>
     <p:extLst>
       <p:ext uri="{BB962C8B-B14F-4D97-AF65-F5344CB8AC3E}">
-        <p14:creationId xmlns:p14="http://schemas.microsoft.com/office/powerpoint/2010/main" xmlns="" val="2410021086"/>
+        <p14:creationId xmlns:p14="http://schemas.microsoft.com/office/powerpoint/2010/main" val="2410021086"/>
       </p:ext>
     </p:extLst>
   </p:cSld>
@@ -766,7 +795,7 @@
           <a:blip r:embed="rId2" cstate="print">
             <a:extLst>
               <a:ext uri="{28A0092B-C50C-407E-A947-70E740481C1C}">
-                <a14:useLocalDpi xmlns:a14="http://schemas.microsoft.com/office/drawing/2010/main" xmlns="" val="0"/>
+                <a14:useLocalDpi xmlns:a14="http://schemas.microsoft.com/office/drawing/2010/main" val="0"/>
               </a:ext>
             </a:extLst>
           </a:blip>
@@ -974,7 +1003,7 @@
           <a:blip r:embed="rId3" cstate="print">
             <a:extLst>
               <a:ext uri="{28A0092B-C50C-407E-A947-70E740481C1C}">
-                <a14:useLocalDpi xmlns:a14="http://schemas.microsoft.com/office/drawing/2010/main" xmlns="" val="0"/>
+                <a14:useLocalDpi xmlns:a14="http://schemas.microsoft.com/office/drawing/2010/main" val="0"/>
               </a:ext>
             </a:extLst>
           </a:blip>
@@ -994,7 +1023,7 @@
           <a:noFill/>
           <a:extLst>
             <a:ext uri="{909E8E84-426E-40DD-AFC4-6F175D3DCCD1}">
-              <a14:hiddenFill xmlns:a14="http://schemas.microsoft.com/office/drawing/2010/main" xmlns="">
+              <a14:hiddenFill xmlns:a14="http://schemas.microsoft.com/office/drawing/2010/main">
                 <a:solidFill>
                   <a:srgbClr val="FFFFFF"/>
                 </a:solidFill>
@@ -1047,7 +1076,7 @@
     </p:spTree>
     <p:extLst>
       <p:ext uri="{BB962C8B-B14F-4D97-AF65-F5344CB8AC3E}">
-        <p14:creationId xmlns:p14="http://schemas.microsoft.com/office/powerpoint/2010/main" xmlns="" val="1219754079"/>
+        <p14:creationId xmlns:p14="http://schemas.microsoft.com/office/powerpoint/2010/main" val="1219754079"/>
       </p:ext>
     </p:extLst>
   </p:cSld>
@@ -1381,7 +1410,7 @@
           <a:blip r:embed="rId2" cstate="print">
             <a:extLst>
               <a:ext uri="{28A0092B-C50C-407E-A947-70E740481C1C}">
-                <a14:useLocalDpi xmlns:a14="http://schemas.microsoft.com/office/drawing/2010/main" xmlns="" val="0"/>
+                <a14:useLocalDpi xmlns:a14="http://schemas.microsoft.com/office/drawing/2010/main" val="0"/>
               </a:ext>
             </a:extLst>
           </a:blip>
@@ -2149,7 +2178,7 @@
     </p:spTree>
     <p:extLst>
       <p:ext uri="{BB962C8B-B14F-4D97-AF65-F5344CB8AC3E}">
-        <p14:creationId xmlns:p14="http://schemas.microsoft.com/office/powerpoint/2010/main" xmlns="" val="3431472105"/>
+        <p14:creationId xmlns:p14="http://schemas.microsoft.com/office/powerpoint/2010/main" val="3431472105"/>
       </p:ext>
     </p:extLst>
   </p:cSld>
@@ -2324,7 +2353,7 @@
           <a:blip r:embed="rId2" cstate="print">
             <a:extLst>
               <a:ext uri="{28A0092B-C50C-407E-A947-70E740481C1C}">
-                <a14:useLocalDpi xmlns:a14="http://schemas.microsoft.com/office/drawing/2010/main" xmlns="" val="0"/>
+                <a14:useLocalDpi xmlns:a14="http://schemas.microsoft.com/office/drawing/2010/main" val="0"/>
               </a:ext>
             </a:extLst>
           </a:blip>
@@ -3047,7 +3076,7 @@
     </p:spTree>
     <p:extLst>
       <p:ext uri="{BB962C8B-B14F-4D97-AF65-F5344CB8AC3E}">
-        <p14:creationId xmlns:p14="http://schemas.microsoft.com/office/powerpoint/2010/main" xmlns="" val="3299255021"/>
+        <p14:creationId xmlns:p14="http://schemas.microsoft.com/office/powerpoint/2010/main" val="3299255021"/>
       </p:ext>
     </p:extLst>
   </p:cSld>
@@ -3177,7 +3206,7 @@
     </p:spTree>
     <p:extLst>
       <p:ext uri="{BB962C8B-B14F-4D97-AF65-F5344CB8AC3E}">
-        <p14:creationId xmlns:p14="http://schemas.microsoft.com/office/powerpoint/2010/main" xmlns="" val="1639072039"/>
+        <p14:creationId xmlns:p14="http://schemas.microsoft.com/office/powerpoint/2010/main" val="1639072039"/>
       </p:ext>
     </p:extLst>
   </p:cSld>
@@ -3357,7 +3386,7 @@
     </p:spTree>
     <p:extLst>
       <p:ext uri="{BB962C8B-B14F-4D97-AF65-F5344CB8AC3E}">
-        <p14:creationId xmlns:p14="http://schemas.microsoft.com/office/powerpoint/2010/main" xmlns="" val="2385074467"/>
+        <p14:creationId xmlns:p14="http://schemas.microsoft.com/office/powerpoint/2010/main" val="2385074467"/>
       </p:ext>
     </p:extLst>
   </p:cSld>
@@ -3627,7 +3656,7 @@
     </p:spTree>
     <p:extLst>
       <p:ext uri="{BB962C8B-B14F-4D97-AF65-F5344CB8AC3E}">
-        <p14:creationId xmlns:p14="http://schemas.microsoft.com/office/powerpoint/2010/main" xmlns="" val="1686714756"/>
+        <p14:creationId xmlns:p14="http://schemas.microsoft.com/office/powerpoint/2010/main" val="1686714756"/>
       </p:ext>
     </p:extLst>
   </p:cSld>
@@ -3887,7 +3916,7 @@
     </p:spTree>
     <p:extLst>
       <p:ext uri="{BB962C8B-B14F-4D97-AF65-F5344CB8AC3E}">
-        <p14:creationId xmlns:p14="http://schemas.microsoft.com/office/powerpoint/2010/main" xmlns="" val="2065493769"/>
+        <p14:creationId xmlns:p14="http://schemas.microsoft.com/office/powerpoint/2010/main" val="2065493769"/>
       </p:ext>
     </p:extLst>
   </p:cSld>
@@ -4147,7 +4176,7 @@
     </p:spTree>
     <p:extLst>
       <p:ext uri="{BB962C8B-B14F-4D97-AF65-F5344CB8AC3E}">
-        <p14:creationId xmlns:p14="http://schemas.microsoft.com/office/powerpoint/2010/main" xmlns="" val="3878039128"/>
+        <p14:creationId xmlns:p14="http://schemas.microsoft.com/office/powerpoint/2010/main" val="3878039128"/>
       </p:ext>
     </p:extLst>
   </p:cSld>
@@ -4683,7 +4712,7 @@
     </p:spTree>
     <p:extLst>
       <p:ext uri="{BB962C8B-B14F-4D97-AF65-F5344CB8AC3E}">
-        <p14:creationId xmlns:p14="http://schemas.microsoft.com/office/powerpoint/2010/main" xmlns="" val="1833973714"/>
+        <p14:creationId xmlns:p14="http://schemas.microsoft.com/office/powerpoint/2010/main" val="1833973714"/>
       </p:ext>
     </p:extLst>
   </p:cSld>
@@ -4923,7 +4952,7 @@
     </p:spTree>
     <p:extLst>
       <p:ext uri="{BB962C8B-B14F-4D97-AF65-F5344CB8AC3E}">
-        <p14:creationId xmlns:p14="http://schemas.microsoft.com/office/powerpoint/2010/main" xmlns="" val="3917054291"/>
+        <p14:creationId xmlns:p14="http://schemas.microsoft.com/office/powerpoint/2010/main" val="3917054291"/>
       </p:ext>
     </p:extLst>
   </p:cSld>
@@ -5206,7 +5235,7 @@
           <a:blip r:embed="rId2" cstate="print">
             <a:extLst>
               <a:ext uri="{28A0092B-C50C-407E-A947-70E740481C1C}">
-                <a14:useLocalDpi xmlns:a14="http://schemas.microsoft.com/office/drawing/2010/main" xmlns="" val="0"/>
+                <a14:useLocalDpi xmlns:a14="http://schemas.microsoft.com/office/drawing/2010/main" val="0"/>
               </a:ext>
             </a:extLst>
           </a:blip>
@@ -5226,7 +5255,7 @@
           <a:noFill/>
           <a:extLst>
             <a:ext uri="{909E8E84-426E-40DD-AFC4-6F175D3DCCD1}">
-              <a14:hiddenFill xmlns:a14="http://schemas.microsoft.com/office/drawing/2010/main" xmlns="">
+              <a14:hiddenFill xmlns:a14="http://schemas.microsoft.com/office/drawing/2010/main">
                 <a:solidFill>
                   <a:srgbClr val="FFFFFF"/>
                 </a:solidFill>
@@ -5335,7 +5364,7 @@
     </p:spTree>
     <p:extLst>
       <p:ext uri="{BB962C8B-B14F-4D97-AF65-F5344CB8AC3E}">
-        <p14:creationId xmlns:p14="http://schemas.microsoft.com/office/powerpoint/2010/main" xmlns="" val="3725441892"/>
+        <p14:creationId xmlns:p14="http://schemas.microsoft.com/office/powerpoint/2010/main" val="3725441892"/>
       </p:ext>
     </p:extLst>
   </p:cSld>
@@ -5382,7 +5411,7 @@
           <a:blip r:embed="rId2" cstate="print">
             <a:extLst>
               <a:ext uri="{28A0092B-C50C-407E-A947-70E740481C1C}">
-                <a14:useLocalDpi xmlns:a14="http://schemas.microsoft.com/office/drawing/2010/main" xmlns="" val="0"/>
+                <a14:useLocalDpi xmlns:a14="http://schemas.microsoft.com/office/drawing/2010/main" val="0"/>
               </a:ext>
             </a:extLst>
           </a:blip>
@@ -5628,7 +5657,7 @@
           <a:blip r:embed="rId3" cstate="print">
             <a:extLst>
               <a:ext uri="{28A0092B-C50C-407E-A947-70E740481C1C}">
-                <a14:useLocalDpi xmlns:a14="http://schemas.microsoft.com/office/drawing/2010/main" xmlns="" val="0"/>
+                <a14:useLocalDpi xmlns:a14="http://schemas.microsoft.com/office/drawing/2010/main" val="0"/>
               </a:ext>
             </a:extLst>
           </a:blip>
@@ -5648,7 +5677,7 @@
           <a:noFill/>
           <a:extLst>
             <a:ext uri="{909E8E84-426E-40DD-AFC4-6F175D3DCCD1}">
-              <a14:hiddenFill xmlns:a14="http://schemas.microsoft.com/office/drawing/2010/main" xmlns="">
+              <a14:hiddenFill xmlns:a14="http://schemas.microsoft.com/office/drawing/2010/main">
                 <a:solidFill>
                   <a:srgbClr val="FFFFFF"/>
                 </a:solidFill>
@@ -5660,7 +5689,7 @@
     </p:spTree>
     <p:extLst>
       <p:ext uri="{BB962C8B-B14F-4D97-AF65-F5344CB8AC3E}">
-        <p14:creationId xmlns:p14="http://schemas.microsoft.com/office/powerpoint/2010/main" xmlns="" val="2086118830"/>
+        <p14:creationId xmlns:p14="http://schemas.microsoft.com/office/powerpoint/2010/main" val="2086118830"/>
       </p:ext>
     </p:extLst>
   </p:cSld>
@@ -5706,7 +5735,7 @@
           <a:blip r:embed="rId2" cstate="print">
             <a:extLst>
               <a:ext uri="{28A0092B-C50C-407E-A947-70E740481C1C}">
-                <a14:useLocalDpi xmlns:a14="http://schemas.microsoft.com/office/drawing/2010/main" xmlns="" val="0"/>
+                <a14:useLocalDpi xmlns:a14="http://schemas.microsoft.com/office/drawing/2010/main" val="0"/>
               </a:ext>
             </a:extLst>
           </a:blip>
@@ -5915,7 +5944,7 @@
           <a:blip r:embed="rId3" cstate="print">
             <a:extLst>
               <a:ext uri="{28A0092B-C50C-407E-A947-70E740481C1C}">
-                <a14:useLocalDpi xmlns:a14="http://schemas.microsoft.com/office/drawing/2010/main" xmlns="" val="0"/>
+                <a14:useLocalDpi xmlns:a14="http://schemas.microsoft.com/office/drawing/2010/main" val="0"/>
               </a:ext>
             </a:extLst>
           </a:blip>
@@ -5935,7 +5964,7 @@
           <a:noFill/>
           <a:extLst>
             <a:ext uri="{909E8E84-426E-40DD-AFC4-6F175D3DCCD1}">
-              <a14:hiddenFill xmlns:a14="http://schemas.microsoft.com/office/drawing/2010/main" xmlns="">
+              <a14:hiddenFill xmlns:a14="http://schemas.microsoft.com/office/drawing/2010/main">
                 <a:solidFill>
                   <a:srgbClr val="FFFFFF"/>
                 </a:solidFill>
@@ -5988,7 +6017,7 @@
     </p:spTree>
     <p:extLst>
       <p:ext uri="{BB962C8B-B14F-4D97-AF65-F5344CB8AC3E}">
-        <p14:creationId xmlns:p14="http://schemas.microsoft.com/office/powerpoint/2010/main" xmlns="" val="2943676588"/>
+        <p14:creationId xmlns:p14="http://schemas.microsoft.com/office/powerpoint/2010/main" val="2943676588"/>
       </p:ext>
     </p:extLst>
   </p:cSld>
@@ -6034,7 +6063,7 @@
           <a:blip r:embed="rId2" cstate="print">
             <a:extLst>
               <a:ext uri="{28A0092B-C50C-407E-A947-70E740481C1C}">
-                <a14:useLocalDpi xmlns:a14="http://schemas.microsoft.com/office/drawing/2010/main" xmlns="" val="0"/>
+                <a14:useLocalDpi xmlns:a14="http://schemas.microsoft.com/office/drawing/2010/main" val="0"/>
               </a:ext>
             </a:extLst>
           </a:blip>
@@ -6239,7 +6268,7 @@
           <a:blip r:embed="rId3" cstate="print">
             <a:extLst>
               <a:ext uri="{28A0092B-C50C-407E-A947-70E740481C1C}">
-                <a14:useLocalDpi xmlns:a14="http://schemas.microsoft.com/office/drawing/2010/main" xmlns="" val="0"/>
+                <a14:useLocalDpi xmlns:a14="http://schemas.microsoft.com/office/drawing/2010/main" val="0"/>
               </a:ext>
             </a:extLst>
           </a:blip>
@@ -6259,7 +6288,7 @@
           <a:noFill/>
           <a:extLst>
             <a:ext uri="{909E8E84-426E-40DD-AFC4-6F175D3DCCD1}">
-              <a14:hiddenFill xmlns:a14="http://schemas.microsoft.com/office/drawing/2010/main" xmlns="">
+              <a14:hiddenFill xmlns:a14="http://schemas.microsoft.com/office/drawing/2010/main">
                 <a:solidFill>
                   <a:srgbClr val="FFFFFF"/>
                 </a:solidFill>
@@ -6312,7 +6341,7 @@
     </p:spTree>
     <p:extLst>
       <p:ext uri="{BB962C8B-B14F-4D97-AF65-F5344CB8AC3E}">
-        <p14:creationId xmlns:p14="http://schemas.microsoft.com/office/powerpoint/2010/main" xmlns="" val="1851703632"/>
+        <p14:creationId xmlns:p14="http://schemas.microsoft.com/office/powerpoint/2010/main" val="1851703632"/>
       </p:ext>
     </p:extLst>
   </p:cSld>
@@ -6358,7 +6387,7 @@
           <a:blip r:embed="rId2" cstate="print">
             <a:extLst>
               <a:ext uri="{28A0092B-C50C-407E-A947-70E740481C1C}">
-                <a14:useLocalDpi xmlns:a14="http://schemas.microsoft.com/office/drawing/2010/main" xmlns="" val="0"/>
+                <a14:useLocalDpi xmlns:a14="http://schemas.microsoft.com/office/drawing/2010/main" val="0"/>
               </a:ext>
             </a:extLst>
           </a:blip>
@@ -6563,7 +6592,7 @@
           <a:blip r:embed="rId3" cstate="print">
             <a:extLst>
               <a:ext uri="{28A0092B-C50C-407E-A947-70E740481C1C}">
-                <a14:useLocalDpi xmlns:a14="http://schemas.microsoft.com/office/drawing/2010/main" xmlns="" val="0"/>
+                <a14:useLocalDpi xmlns:a14="http://schemas.microsoft.com/office/drawing/2010/main" val="0"/>
               </a:ext>
             </a:extLst>
           </a:blip>
@@ -6583,7 +6612,7 @@
           <a:noFill/>
           <a:extLst>
             <a:ext uri="{909E8E84-426E-40DD-AFC4-6F175D3DCCD1}">
-              <a14:hiddenFill xmlns:a14="http://schemas.microsoft.com/office/drawing/2010/main" xmlns="">
+              <a14:hiddenFill xmlns:a14="http://schemas.microsoft.com/office/drawing/2010/main">
                 <a:solidFill>
                   <a:srgbClr val="FFFFFF"/>
                 </a:solidFill>
@@ -6636,7 +6665,7 @@
     </p:spTree>
     <p:extLst>
       <p:ext uri="{BB962C8B-B14F-4D97-AF65-F5344CB8AC3E}">
-        <p14:creationId xmlns:p14="http://schemas.microsoft.com/office/powerpoint/2010/main" xmlns="" val="1851703632"/>
+        <p14:creationId xmlns:p14="http://schemas.microsoft.com/office/powerpoint/2010/main" val="1851703632"/>
       </p:ext>
     </p:extLst>
   </p:cSld>
@@ -6919,7 +6948,7 @@
           <a:blip r:embed="rId2" cstate="print">
             <a:extLst>
               <a:ext uri="{28A0092B-C50C-407E-A947-70E740481C1C}">
-                <a14:useLocalDpi xmlns:a14="http://schemas.microsoft.com/office/drawing/2010/main" xmlns="" val="0"/>
+                <a14:useLocalDpi xmlns:a14="http://schemas.microsoft.com/office/drawing/2010/main" val="0"/>
               </a:ext>
             </a:extLst>
           </a:blip>
@@ -6939,7 +6968,7 @@
           <a:noFill/>
           <a:extLst>
             <a:ext uri="{909E8E84-426E-40DD-AFC4-6F175D3DCCD1}">
-              <a14:hiddenFill xmlns:a14="http://schemas.microsoft.com/office/drawing/2010/main" xmlns="">
+              <a14:hiddenFill xmlns:a14="http://schemas.microsoft.com/office/drawing/2010/main">
                 <a:solidFill>
                   <a:srgbClr val="FFFFFF"/>
                 </a:solidFill>
@@ -7048,7 +7077,7 @@
     </p:spTree>
     <p:extLst>
       <p:ext uri="{BB962C8B-B14F-4D97-AF65-F5344CB8AC3E}">
-        <p14:creationId xmlns:p14="http://schemas.microsoft.com/office/powerpoint/2010/main" xmlns="" val="3725441892"/>
+        <p14:creationId xmlns:p14="http://schemas.microsoft.com/office/powerpoint/2010/main" val="3725441892"/>
       </p:ext>
     </p:extLst>
   </p:cSld>
@@ -7312,7 +7341,7 @@
           <a:blip r:embed="rId2" cstate="print">
             <a:extLst>
               <a:ext uri="{28A0092B-C50C-407E-A947-70E740481C1C}">
-                <a14:useLocalDpi xmlns:a14="http://schemas.microsoft.com/office/drawing/2010/main" xmlns="" val="0"/>
+                <a14:useLocalDpi xmlns:a14="http://schemas.microsoft.com/office/drawing/2010/main" val="0"/>
               </a:ext>
             </a:extLst>
           </a:blip>
@@ -7332,7 +7361,7 @@
           <a:noFill/>
           <a:extLst>
             <a:ext uri="{909E8E84-426E-40DD-AFC4-6F175D3DCCD1}">
-              <a14:hiddenFill xmlns:a14="http://schemas.microsoft.com/office/drawing/2010/main" xmlns="">
+              <a14:hiddenFill xmlns:a14="http://schemas.microsoft.com/office/drawing/2010/main">
                 <a:solidFill>
                   <a:srgbClr val="FFFFFF"/>
                 </a:solidFill>
@@ -7385,7 +7414,7 @@
     </p:spTree>
     <p:extLst>
       <p:ext uri="{BB962C8B-B14F-4D97-AF65-F5344CB8AC3E}">
-        <p14:creationId xmlns:p14="http://schemas.microsoft.com/office/powerpoint/2010/main" xmlns="" val="2130376097"/>
+        <p14:creationId xmlns:p14="http://schemas.microsoft.com/office/powerpoint/2010/main" val="2130376097"/>
       </p:ext>
     </p:extLst>
   </p:cSld>
@@ -7719,7 +7748,7 @@
           <a:blip r:embed="rId2" cstate="print">
             <a:extLst>
               <a:ext uri="{28A0092B-C50C-407E-A947-70E740481C1C}">
-                <a14:useLocalDpi xmlns:a14="http://schemas.microsoft.com/office/drawing/2010/main" xmlns="" val="0"/>
+                <a14:useLocalDpi xmlns:a14="http://schemas.microsoft.com/office/drawing/2010/main" val="0"/>
               </a:ext>
             </a:extLst>
           </a:blip>
@@ -7833,7 +7862,7 @@
     </p:spTree>
     <p:extLst>
       <p:ext uri="{BB962C8B-B14F-4D97-AF65-F5344CB8AC3E}">
-        <p14:creationId xmlns:p14="http://schemas.microsoft.com/office/powerpoint/2010/main" xmlns="" val="1192912937"/>
+        <p14:creationId xmlns:p14="http://schemas.microsoft.com/office/powerpoint/2010/main" val="1192912937"/>
       </p:ext>
     </p:extLst>
   </p:cSld>
@@ -8167,7 +8196,7 @@
           <a:blip r:embed="rId2" cstate="print">
             <a:extLst>
               <a:ext uri="{28A0092B-C50C-407E-A947-70E740481C1C}">
-                <a14:useLocalDpi xmlns:a14="http://schemas.microsoft.com/office/drawing/2010/main" xmlns="" val="0"/>
+                <a14:useLocalDpi xmlns:a14="http://schemas.microsoft.com/office/drawing/2010/main" val="0"/>
               </a:ext>
             </a:extLst>
           </a:blip>
@@ -8608,7 +8637,7 @@
     </p:spTree>
     <p:extLst>
       <p:ext uri="{BB962C8B-B14F-4D97-AF65-F5344CB8AC3E}">
-        <p14:creationId xmlns:p14="http://schemas.microsoft.com/office/powerpoint/2010/main" xmlns="" val="2532449671"/>
+        <p14:creationId xmlns:p14="http://schemas.microsoft.com/office/powerpoint/2010/main" val="2532449671"/>
       </p:ext>
     </p:extLst>
   </p:cSld>
@@ -9106,14 +9135,14 @@
           </a:ln>
           <a:extLst>
             <a:ext uri="{909E8E84-426E-40DD-AFC4-6F175D3DCCD1}">
-              <a14:hiddenFill xmlns:a14="http://schemas.microsoft.com/office/drawing/2010/main" xmlns="">
+              <a14:hiddenFill xmlns:a14="http://schemas.microsoft.com/office/drawing/2010/main">
                 <a:solidFill>
                   <a:srgbClr val="FFFFFF"/>
                 </a:solidFill>
               </a14:hiddenFill>
             </a:ext>
             <a:ext uri="{91240B29-F687-4F45-9708-019B960494DF}">
-              <a14:hiddenLine xmlns:a14="http://schemas.microsoft.com/office/drawing/2010/main" xmlns="" w="9525">
+              <a14:hiddenLine xmlns:a14="http://schemas.microsoft.com/office/drawing/2010/main" w="9525">
                 <a:solidFill>
                   <a:srgbClr val="000000"/>
                 </a:solidFill>
@@ -9189,14 +9218,14 @@
           </a:ln>
           <a:extLst>
             <a:ext uri="{909E8E84-426E-40DD-AFC4-6F175D3DCCD1}">
-              <a14:hiddenFill xmlns:a14="http://schemas.microsoft.com/office/drawing/2010/main" xmlns="">
+              <a14:hiddenFill xmlns:a14="http://schemas.microsoft.com/office/drawing/2010/main">
                 <a:solidFill>
                   <a:srgbClr val="FFFFFF"/>
                 </a:solidFill>
               </a14:hiddenFill>
             </a:ext>
             <a:ext uri="{91240B29-F687-4F45-9708-019B960494DF}">
-              <a14:hiddenLine xmlns:a14="http://schemas.microsoft.com/office/drawing/2010/main" xmlns="" w="9525">
+              <a14:hiddenLine xmlns:a14="http://schemas.microsoft.com/office/drawing/2010/main" w="9525">
                 <a:solidFill>
                   <a:srgbClr val="000000"/>
                 </a:solidFill>
@@ -9296,7 +9325,7 @@
           <a:blip r:embed="rId10" cstate="print">
             <a:extLst>
               <a:ext uri="{28A0092B-C50C-407E-A947-70E740481C1C}">
-                <a14:useLocalDpi xmlns:a14="http://schemas.microsoft.com/office/drawing/2010/main" xmlns="" val="0"/>
+                <a14:useLocalDpi xmlns:a14="http://schemas.microsoft.com/office/drawing/2010/main" val="0"/>
               </a:ext>
             </a:extLst>
           </a:blip>
@@ -9316,7 +9345,7 @@
           <a:noFill/>
           <a:extLst>
             <a:ext uri="{909E8E84-426E-40DD-AFC4-6F175D3DCCD1}">
-              <a14:hiddenFill xmlns:a14="http://schemas.microsoft.com/office/drawing/2010/main" xmlns="">
+              <a14:hiddenFill xmlns:a14="http://schemas.microsoft.com/office/drawing/2010/main">
                 <a:solidFill>
                   <a:srgbClr val="FFFFFF"/>
                 </a:solidFill>
@@ -9910,7 +9939,7 @@
     </p:spTree>
     <p:extLst>
       <p:ext uri="{BB962C8B-B14F-4D97-AF65-F5344CB8AC3E}">
-        <p14:creationId xmlns:p14="http://schemas.microsoft.com/office/powerpoint/2010/main" xmlns="" val="2398208970"/>
+        <p14:creationId xmlns:p14="http://schemas.microsoft.com/office/powerpoint/2010/main" val="2398208970"/>
       </p:ext>
     </p:extLst>
   </p:cSld>
@@ -10276,7 +10305,7 @@
     </p:spTree>
     <p:extLst>
       <p:ext uri="{BB962C8B-B14F-4D97-AF65-F5344CB8AC3E}">
-        <p14:creationId xmlns:p14="http://schemas.microsoft.com/office/powerpoint/2010/main" xmlns="" val="4126932602"/>
+        <p14:creationId xmlns:p14="http://schemas.microsoft.com/office/powerpoint/2010/main" val="4126932602"/>
       </p:ext>
     </p:extLst>
   </p:cSld>
@@ -10659,7 +10688,6 @@
               <a:rPr lang="en-US" dirty="0" smtClean="0"/>
               <a:t>SRC</a:t>
             </a:r>
-            <a:endParaRPr lang="en-US" dirty="0" smtClean="0"/>
           </a:p>
           <a:p>
             <a:pPr algn="just"/>
@@ -10916,73 +10944,7 @@
     </p:spTree>
     <p:extLst>
       <p:ext uri="{BB962C8B-B14F-4D97-AF65-F5344CB8AC3E}">
-        <p14:creationId xmlns:p14="http://schemas.microsoft.com/office/powerpoint/2010/main" xmlns="" val="1666520639"/>
-      </p:ext>
-    </p:extLst>
-  </p:cSld>
-  <p:clrMapOvr>
-    <a:masterClrMapping/>
-  </p:clrMapOvr>
-  <p:timing>
-    <p:tnLst>
-      <p:par>
-        <p:cTn id="1" dur="indefinite" restart="never" nodeType="tmRoot"/>
-      </p:par>
-    </p:tnLst>
-  </p:timing>
-</p:sld>
-</file>
-
-<file path=ppt/slides/slide18.xml><?xml version="1.0" encoding="utf-8"?>
-<p:sld xmlns:a="http://schemas.openxmlformats.org/drawingml/2006/main" xmlns:r="http://schemas.openxmlformats.org/officeDocument/2006/relationships" xmlns:p="http://schemas.openxmlformats.org/presentationml/2006/main">
-  <p:cSld>
-    <p:spTree>
-      <p:nvGrpSpPr>
-        <p:cNvPr id="1" name=""/>
-        <p:cNvGrpSpPr/>
-        <p:nvPr/>
-      </p:nvGrpSpPr>
-      <p:grpSpPr>
-        <a:xfrm>
-          <a:off x="0" y="0"/>
-          <a:ext cx="0" cy="0"/>
-          <a:chOff x="0" y="0"/>
-          <a:chExt cx="0" cy="0"/>
-        </a:xfrm>
-      </p:grpSpPr>
-      <p:sp>
-        <p:nvSpPr>
-          <p:cNvPr id="2" name="Text Placeholder 1"/>
-          <p:cNvSpPr>
-            <a:spLocks noGrp="1"/>
-          </p:cNvSpPr>
-          <p:nvPr>
-            <p:ph type="body" sz="quarter" idx="10"/>
-          </p:nvPr>
-        </p:nvSpPr>
-        <p:spPr/>
-        <p:txBody>
-          <a:bodyPr/>
-          <a:lstStyle/>
-          <a:p>
-            <a:r>
-              <a:rPr lang="en-US" dirty="0" smtClean="0"/>
-              <a:t>Softtek</a:t>
-            </a:r>
-          </a:p>
-          <a:p>
-            <a:r>
-              <a:rPr lang="en-US" dirty="0" smtClean="0"/>
-              <a:t>hugo.arroyo@softtek.com</a:t>
-            </a:r>
-            <a:endParaRPr lang="es-MX" dirty="0"/>
-          </a:p>
-        </p:txBody>
-      </p:sp>
-    </p:spTree>
-    <p:extLst>
-      <p:ext uri="{BB962C8B-B14F-4D97-AF65-F5344CB8AC3E}">
-        <p14:creationId xmlns:p14="http://schemas.microsoft.com/office/powerpoint/2010/main" xmlns="" val="989806130"/>
+        <p14:creationId xmlns:p14="http://schemas.microsoft.com/office/powerpoint/2010/main" val="1666520639"/>
       </p:ext>
     </p:extLst>
   </p:cSld>
@@ -11075,7 +11037,7 @@
     </p:spTree>
     <p:extLst>
       <p:ext uri="{BB962C8B-B14F-4D97-AF65-F5344CB8AC3E}">
-        <p14:creationId xmlns:p14="http://schemas.microsoft.com/office/powerpoint/2010/main" xmlns="" val="3239706587"/>
+        <p14:creationId xmlns:p14="http://schemas.microsoft.com/office/powerpoint/2010/main" val="3239706587"/>
       </p:ext>
     </p:extLst>
   </p:cSld>
@@ -11252,7 +11214,7 @@
     </p:spTree>
     <p:extLst>
       <p:ext uri="{BB962C8B-B14F-4D97-AF65-F5344CB8AC3E}">
-        <p14:creationId xmlns:p14="http://schemas.microsoft.com/office/powerpoint/2010/main" xmlns="" val="2847781305"/>
+        <p14:creationId xmlns:p14="http://schemas.microsoft.com/office/powerpoint/2010/main" val="2847781305"/>
       </p:ext>
     </p:extLst>
   </p:cSld>
@@ -11345,7 +11307,7 @@
     </p:spTree>
     <p:extLst>
       <p:ext uri="{BB962C8B-B14F-4D97-AF65-F5344CB8AC3E}">
-        <p14:creationId xmlns:p14="http://schemas.microsoft.com/office/powerpoint/2010/main" xmlns="" val="3239706587"/>
+        <p14:creationId xmlns:p14="http://schemas.microsoft.com/office/powerpoint/2010/main" val="3239706587"/>
       </p:ext>
     </p:extLst>
   </p:cSld>
@@ -11397,14 +11359,23 @@
             <a:pPr algn="just"/>
             <a:r>
               <a:rPr lang="en-US" dirty="0" smtClean="0"/>
-              <a:t>Java’s IO libraries are designed in an abstract way that enables you to read from external data sources and write to external targets, regardless of the kind of thing you are writing or reading from. You use the same methods to read from a file that you do to read from a console or from a network connection. You use the same methods to write to a file  that you do to write to a byte array or serial port device.</a:t>
-            </a:r>
+              <a:t>Java’s IO libraries are designed in an abstract way that enables you to read from external data sources and write to external targets, regardless of the kind of thing you are writing or reading from. You use the same methods to read from a file that you do to read from a console or from a network connection. You use the same methods to write to a file  that you do to write to a byte array or serial port device</a:t>
+            </a:r>
+            <a:r>
+              <a:rPr lang="en-US" dirty="0"/>
+              <a:t>. Reading and Writing without caring where your data is coming from or where it’s going is a very powerful abstraction. Among other things</a:t>
+            </a:r>
+            <a:endParaRPr lang="en-US" dirty="0" smtClean="0"/>
           </a:p>
           <a:p>
             <a:pPr algn="just"/>
             <a:r>
               <a:rPr lang="en-US" dirty="0" smtClean="0"/>
-              <a:t>Reading and Writing without caring where your data is coming from or where it’s going is a very powerful abstraction. Among other things, this enable you to define I/O streams that automatically compress, encrypt, and filter from one data format to another.</a:t>
+              <a:t>, </a:t>
+            </a:r>
+            <a:r>
+              <a:rPr lang="en-US" dirty="0" smtClean="0"/>
+              <a:t>this enable you to define I/O streams that automatically compress, encrypt, and filter from one data format to another.</a:t>
             </a:r>
           </a:p>
           <a:p>
@@ -11532,7 +11503,27 @@
             <a:pPr algn="just"/>
             <a:r>
               <a:rPr lang="en-US" dirty="0" smtClean="0"/>
-              <a:t>Output streams move bytes of data into a Java program from some generally external target.</a:t>
+              <a:t>Output streams move bytes of data </a:t>
+            </a:r>
+            <a:r>
+              <a:rPr lang="en-US" dirty="0" smtClean="0"/>
+              <a:t>from </a:t>
+            </a:r>
+            <a:r>
+              <a:rPr lang="en-US" dirty="0" smtClean="0"/>
+              <a:t>a </a:t>
+            </a:r>
+            <a:r>
+              <a:rPr lang="en-US" dirty="0" smtClean="0"/>
+              <a:t>Java program </a:t>
+            </a:r>
+            <a:r>
+              <a:rPr lang="en-US" dirty="0" smtClean="0"/>
+              <a:t>into some </a:t>
+            </a:r>
+            <a:r>
+              <a:rPr lang="en-US" dirty="0" smtClean="0"/>
+              <a:t>generally external target.</a:t>
             </a:r>
           </a:p>
           <a:p>

</xml_diff>